<commit_message>
adding slide2 e editing slide1
</commit_message>
<xml_diff>
--- a/slides/aula 1.pptx
+++ b/slides/aula 1.pptx
@@ -5,7 +5,7 @@
     <p:sldMasterId id="2147483684" r:id="rId1"/>
   </p:sldMasterIdLst>
   <p:notesMasterIdLst>
-    <p:notesMasterId r:id="rId40"/>
+    <p:notesMasterId r:id="rId41"/>
   </p:notesMasterIdLst>
   <p:sldIdLst>
     <p:sldId id="256" r:id="rId2"/>
@@ -34,18 +34,19 @@
     <p:sldId id="286" r:id="rId25"/>
     <p:sldId id="287" r:id="rId26"/>
     <p:sldId id="288" r:id="rId27"/>
-    <p:sldId id="289" r:id="rId28"/>
-    <p:sldId id="290" r:id="rId29"/>
-    <p:sldId id="293" r:id="rId30"/>
-    <p:sldId id="297" r:id="rId31"/>
-    <p:sldId id="298" r:id="rId32"/>
-    <p:sldId id="299" r:id="rId33"/>
-    <p:sldId id="300" r:id="rId34"/>
-    <p:sldId id="301" r:id="rId35"/>
-    <p:sldId id="302" r:id="rId36"/>
-    <p:sldId id="304" r:id="rId37"/>
-    <p:sldId id="303" r:id="rId38"/>
-    <p:sldId id="305" r:id="rId39"/>
+    <p:sldId id="307" r:id="rId28"/>
+    <p:sldId id="289" r:id="rId29"/>
+    <p:sldId id="290" r:id="rId30"/>
+    <p:sldId id="293" r:id="rId31"/>
+    <p:sldId id="297" r:id="rId32"/>
+    <p:sldId id="298" r:id="rId33"/>
+    <p:sldId id="299" r:id="rId34"/>
+    <p:sldId id="300" r:id="rId35"/>
+    <p:sldId id="301" r:id="rId36"/>
+    <p:sldId id="302" r:id="rId37"/>
+    <p:sldId id="304" r:id="rId38"/>
+    <p:sldId id="303" r:id="rId39"/>
+    <p:sldId id="305" r:id="rId40"/>
   </p:sldIdLst>
   <p:sldSz cx="9144000" cy="6858000" type="screen4x3"/>
   <p:notesSz cx="6858000" cy="9144000"/>
@@ -4238,7 +4239,13 @@
               <a:rPr lang="en-US" altLang="pt-BR" sz="3600" b="1" dirty="0" smtClean="0">
                 <a:latin typeface="Lucida Console" panose="020B0609040504020204" pitchFamily="49" charset="0"/>
               </a:rPr>
-              <a:t>LPOO I</a:t>
+              <a:t>LPOO </a:t>
+            </a:r>
+            <a:r>
+              <a:rPr lang="en-US" altLang="pt-BR" sz="3600" b="1" dirty="0" smtClean="0">
+                <a:latin typeface="Lucida Console" panose="020B0609040504020204" pitchFamily="49" charset="0"/>
+              </a:rPr>
+              <a:t>I – Aula 1</a:t>
             </a:r>
             <a:endParaRPr lang="en-US" altLang="pt-BR" sz="3600" b="1" dirty="0">
               <a:latin typeface="Lucida Console" panose="020B0609040504020204" pitchFamily="49" charset="0"/>
@@ -9387,18 +9394,8 @@
                 </a:solidFill>
                 <a:latin typeface="Bitter" panose="02000000000000000000" pitchFamily="2" charset="0"/>
               </a:rPr>
-              <a:t>Cada atributo possui: nome, tipo e modificador de acesso</a:t>
-            </a:r>
-          </a:p>
-          <a:p>
-            <a:pPr>
-              <a:buClr>
-                <a:schemeClr val="tx1">
-                  <a:lumMod val="50000"/>
-                  <a:lumOff val="50000"/>
-                </a:schemeClr>
-              </a:buClr>
-            </a:pPr>
+              <a:t>Cada atributo possui: nome, tipo e modificador de </a:t>
+            </a:r>
             <a:r>
               <a:rPr lang="pt-BR" sz="2800" dirty="0" smtClean="0">
                 <a:solidFill>
@@ -9409,19 +9406,7 @@
                 </a:solidFill>
                 <a:latin typeface="Bitter" panose="02000000000000000000" pitchFamily="2" charset="0"/>
               </a:rPr>
-              <a:t>Nome de atributo normalmente é </a:t>
-            </a:r>
-            <a:r>
-              <a:rPr lang="pt-BR" sz="2800" dirty="0" err="1" smtClean="0">
-                <a:solidFill>
-                  <a:schemeClr val="tx1">
-                    <a:lumMod val="95000"/>
-                    <a:lumOff val="5000"/>
-                  </a:schemeClr>
-                </a:solidFill>
-                <a:latin typeface="Bitter" panose="02000000000000000000" pitchFamily="2" charset="0"/>
-              </a:rPr>
-              <a:t>camelCase</a:t>
+              <a:t>acesso</a:t>
             </a:r>
             <a:endParaRPr lang="pt-BR" sz="2800" dirty="0" smtClean="0">
               <a:solidFill>
@@ -9432,28 +9417,6 @@
               </a:solidFill>
               <a:latin typeface="Bitter" panose="02000000000000000000" pitchFamily="2" charset="0"/>
             </a:endParaRPr>
-          </a:p>
-          <a:p>
-            <a:pPr>
-              <a:buClr>
-                <a:schemeClr val="tx1">
-                  <a:lumMod val="50000"/>
-                  <a:lumOff val="50000"/>
-                </a:schemeClr>
-              </a:buClr>
-            </a:pPr>
-            <a:r>
-              <a:rPr lang="pt-BR" sz="2800" dirty="0" smtClean="0">
-                <a:solidFill>
-                  <a:schemeClr val="tx1">
-                    <a:lumMod val="95000"/>
-                    <a:lumOff val="5000"/>
-                  </a:schemeClr>
-                </a:solidFill>
-                <a:latin typeface="Bitter" panose="02000000000000000000" pitchFamily="2" charset="0"/>
-              </a:rPr>
-              <a:t>Atributo pode ser de instância (padrão) ou de classe</a:t>
-            </a:r>
           </a:p>
         </p:txBody>
       </p:sp>
@@ -9631,6 +9594,240 @@
                 </a:solidFill>
                 <a:latin typeface="Bitter" panose="02000000000000000000" pitchFamily="2" charset="0"/>
               </a:rPr>
+              <a:t>Nome </a:t>
+            </a:r>
+            <a:r>
+              <a:rPr lang="pt-BR" sz="2800" dirty="0" smtClean="0">
+                <a:solidFill>
+                  <a:schemeClr val="tx1">
+                    <a:lumMod val="95000"/>
+                    <a:lumOff val="5000"/>
+                  </a:schemeClr>
+                </a:solidFill>
+                <a:latin typeface="Bitter" panose="02000000000000000000" pitchFamily="2" charset="0"/>
+              </a:rPr>
+              <a:t>de atributo normalmente é </a:t>
+            </a:r>
+            <a:r>
+              <a:rPr lang="pt-BR" sz="2800" dirty="0" err="1" smtClean="0">
+                <a:solidFill>
+                  <a:schemeClr val="tx1">
+                    <a:lumMod val="95000"/>
+                    <a:lumOff val="5000"/>
+                  </a:schemeClr>
+                </a:solidFill>
+                <a:latin typeface="Bitter" panose="02000000000000000000" pitchFamily="2" charset="0"/>
+              </a:rPr>
+              <a:t>camelCase</a:t>
+            </a:r>
+            <a:endParaRPr lang="pt-BR" sz="2800" dirty="0" smtClean="0">
+              <a:solidFill>
+                <a:schemeClr val="tx1">
+                  <a:lumMod val="95000"/>
+                  <a:lumOff val="5000"/>
+                </a:schemeClr>
+              </a:solidFill>
+              <a:latin typeface="Bitter" panose="02000000000000000000" pitchFamily="2" charset="0"/>
+            </a:endParaRPr>
+          </a:p>
+          <a:p>
+            <a:pPr>
+              <a:buClr>
+                <a:schemeClr val="tx1">
+                  <a:lumMod val="50000"/>
+                  <a:lumOff val="50000"/>
+                </a:schemeClr>
+              </a:buClr>
+            </a:pPr>
+            <a:r>
+              <a:rPr lang="pt-BR" sz="2800" dirty="0" smtClean="0">
+                <a:solidFill>
+                  <a:schemeClr val="tx1">
+                    <a:lumMod val="95000"/>
+                    <a:lumOff val="5000"/>
+                  </a:schemeClr>
+                </a:solidFill>
+                <a:latin typeface="Bitter" panose="02000000000000000000" pitchFamily="2" charset="0"/>
+              </a:rPr>
+              <a:t>Atributo pode ser de instância (padrão) ou de classe</a:t>
+            </a:r>
+          </a:p>
+        </p:txBody>
+      </p:sp>
+      <p:pic>
+        <p:nvPicPr>
+          <p:cNvPr id="14339" name="Picture 3"/>
+          <p:cNvPicPr>
+            <a:picLocks noChangeAspect="1" noChangeArrowheads="1"/>
+          </p:cNvPicPr>
+          <p:nvPr/>
+        </p:nvPicPr>
+        <p:blipFill>
+          <a:blip r:embed="rId2">
+            <a:extLst>
+              <a:ext uri="{28A0092B-C50C-407E-A947-70E740481C1C}">
+                <a14:useLocalDpi xmlns:a14="http://schemas.microsoft.com/office/drawing/2010/main" val="0"/>
+              </a:ext>
+            </a:extLst>
+          </a:blip>
+          <a:srcRect/>
+          <a:stretch>
+            <a:fillRect/>
+          </a:stretch>
+        </p:blipFill>
+        <p:spPr bwMode="auto">
+          <a:xfrm>
+            <a:off x="1199807" y="4131146"/>
+            <a:ext cx="6756569" cy="2178174"/>
+          </a:xfrm>
+          <a:prstGeom prst="rect">
+            <a:avLst/>
+          </a:prstGeom>
+          <a:noFill/>
+          <a:ln>
+            <a:noFill/>
+          </a:ln>
+          <a:extLst>
+            <a:ext uri="{909E8E84-426E-40DD-AFC4-6F175D3DCCD1}">
+              <a14:hiddenFill xmlns:a14="http://schemas.microsoft.com/office/drawing/2010/main">
+                <a:solidFill>
+                  <a:schemeClr val="accent1"/>
+                </a:solidFill>
+              </a14:hiddenFill>
+            </a:ext>
+            <a:ext uri="{91240B29-F687-4F45-9708-019B960494DF}">
+              <a14:hiddenLine xmlns:a14="http://schemas.microsoft.com/office/drawing/2010/main" w="9525">
+                <a:solidFill>
+                  <a:schemeClr val="tx1"/>
+                </a:solidFill>
+                <a:miter lim="800000"/>
+                <a:headEnd/>
+                <a:tailEnd/>
+              </a14:hiddenLine>
+            </a:ext>
+          </a:extLst>
+        </p:spPr>
+      </p:pic>
+    </p:spTree>
+    <p:extLst>
+      <p:ext uri="{BB962C8B-B14F-4D97-AF65-F5344CB8AC3E}">
+        <p14:creationId xmlns:p14="http://schemas.microsoft.com/office/powerpoint/2010/main" val="245294915"/>
+      </p:ext>
+    </p:extLst>
+  </p:cSld>
+  <p:clrMapOvr>
+    <a:masterClrMapping/>
+  </p:clrMapOvr>
+  <mc:AlternateContent xmlns:mc="http://schemas.openxmlformats.org/markup-compatibility/2006" xmlns:p14="http://schemas.microsoft.com/office/powerpoint/2010/main">
+    <mc:Choice Requires="p14">
+      <p:transition p14:dur="0"/>
+    </mc:Choice>
+    <mc:Fallback xmlns="">
+      <p:transition/>
+    </mc:Fallback>
+  </mc:AlternateContent>
+  <p:timing>
+    <p:tnLst>
+      <p:par>
+        <p:cTn id="1" dur="indefinite" restart="never" nodeType="tmRoot"/>
+      </p:par>
+    </p:tnLst>
+  </p:timing>
+</p:sld>
+</file>
+
+<file path=ppt/slides/slide28.xml><?xml version="1.0" encoding="utf-8"?>
+<p:sld xmlns:a="http://schemas.openxmlformats.org/drawingml/2006/main" xmlns:r="http://schemas.openxmlformats.org/officeDocument/2006/relationships" xmlns:p="http://schemas.openxmlformats.org/presentationml/2006/main">
+  <p:cSld>
+    <p:spTree>
+      <p:nvGrpSpPr>
+        <p:cNvPr id="1" name=""/>
+        <p:cNvGrpSpPr/>
+        <p:nvPr/>
+      </p:nvGrpSpPr>
+      <p:grpSpPr>
+        <a:xfrm>
+          <a:off x="0" y="0"/>
+          <a:ext cx="0" cy="0"/>
+          <a:chOff x="0" y="0"/>
+          <a:chExt cx="0" cy="0"/>
+        </a:xfrm>
+      </p:grpSpPr>
+      <p:sp>
+        <p:nvSpPr>
+          <p:cNvPr id="2" name="Título 1"/>
+          <p:cNvSpPr>
+            <a:spLocks noGrp="1"/>
+          </p:cNvSpPr>
+          <p:nvPr>
+            <p:ph type="title"/>
+          </p:nvPr>
+        </p:nvSpPr>
+        <p:spPr/>
+        <p:txBody>
+          <a:bodyPr anchor="ctr"/>
+          <a:lstStyle/>
+          <a:p>
+            <a:pPr algn="l"/>
+            <a:r>
+              <a:rPr lang="pt-BR" dirty="0" smtClean="0">
+                <a:solidFill>
+                  <a:schemeClr val="tx1">
+                    <a:lumMod val="50000"/>
+                    <a:lumOff val="50000"/>
+                  </a:schemeClr>
+                </a:solidFill>
+                <a:latin typeface="Bitter" panose="02000000000000000000" pitchFamily="2" charset="0"/>
+              </a:rPr>
+              <a:t>Programação em JAVA</a:t>
+            </a:r>
+            <a:endParaRPr lang="pt-BR" dirty="0">
+              <a:solidFill>
+                <a:schemeClr val="tx1">
+                  <a:lumMod val="50000"/>
+                  <a:lumOff val="50000"/>
+                </a:schemeClr>
+              </a:solidFill>
+              <a:latin typeface="Bitter" panose="02000000000000000000" pitchFamily="2" charset="0"/>
+            </a:endParaRPr>
+          </a:p>
+        </p:txBody>
+      </p:sp>
+      <p:sp>
+        <p:nvSpPr>
+          <p:cNvPr id="3" name="Espaço Reservado para Conteúdo 2"/>
+          <p:cNvSpPr>
+            <a:spLocks noGrp="1"/>
+          </p:cNvSpPr>
+          <p:nvPr>
+            <p:ph idx="1"/>
+          </p:nvPr>
+        </p:nvSpPr>
+        <p:spPr/>
+        <p:txBody>
+          <a:bodyPr>
+            <a:normAutofit/>
+          </a:bodyPr>
+          <a:lstStyle/>
+          <a:p>
+            <a:pPr>
+              <a:buClr>
+                <a:schemeClr val="tx1">
+                  <a:lumMod val="50000"/>
+                  <a:lumOff val="50000"/>
+                </a:schemeClr>
+              </a:buClr>
+            </a:pPr>
+            <a:r>
+              <a:rPr lang="pt-BR" sz="2800" dirty="0" smtClean="0">
+                <a:solidFill>
+                  <a:schemeClr val="tx1">
+                    <a:lumMod val="95000"/>
+                    <a:lumOff val="5000"/>
+                  </a:schemeClr>
+                </a:solidFill>
+                <a:latin typeface="Bitter" panose="02000000000000000000" pitchFamily="2" charset="0"/>
+              </a:rPr>
               <a:t>Atributos de classe (ou estáticos)</a:t>
             </a:r>
           </a:p>
@@ -9853,7 +10050,7 @@
 </p:sld>
 </file>
 
-<file path=ppt/slides/slide28.xml><?xml version="1.0" encoding="utf-8"?>
+<file path=ppt/slides/slide29.xml><?xml version="1.0" encoding="utf-8"?>
 <p:sld xmlns:a="http://schemas.openxmlformats.org/drawingml/2006/main" xmlns:r="http://schemas.openxmlformats.org/officeDocument/2006/relationships" xmlns:p="http://schemas.openxmlformats.org/presentationml/2006/main">
   <p:cSld>
     <p:spTree>
@@ -10149,274 +10346,6 @@
     <p:extLst>
       <p:ext uri="{BB962C8B-B14F-4D97-AF65-F5344CB8AC3E}">
         <p14:creationId xmlns:p14="http://schemas.microsoft.com/office/powerpoint/2010/main" val="3277679581"/>
-      </p:ext>
-    </p:extLst>
-  </p:cSld>
-  <p:clrMapOvr>
-    <a:masterClrMapping/>
-  </p:clrMapOvr>
-  <mc:AlternateContent xmlns:mc="http://schemas.openxmlformats.org/markup-compatibility/2006" xmlns:p14="http://schemas.microsoft.com/office/powerpoint/2010/main">
-    <mc:Choice Requires="p14">
-      <p:transition p14:dur="0"/>
-    </mc:Choice>
-    <mc:Fallback xmlns="">
-      <p:transition/>
-    </mc:Fallback>
-  </mc:AlternateContent>
-  <p:timing>
-    <p:tnLst>
-      <p:par>
-        <p:cTn id="1" dur="indefinite" restart="never" nodeType="tmRoot"/>
-      </p:par>
-    </p:tnLst>
-  </p:timing>
-</p:sld>
-</file>
-
-<file path=ppt/slides/slide29.xml><?xml version="1.0" encoding="utf-8"?>
-<p:sld xmlns:a="http://schemas.openxmlformats.org/drawingml/2006/main" xmlns:r="http://schemas.openxmlformats.org/officeDocument/2006/relationships" xmlns:p="http://schemas.openxmlformats.org/presentationml/2006/main">
-  <p:cSld>
-    <p:spTree>
-      <p:nvGrpSpPr>
-        <p:cNvPr id="1" name=""/>
-        <p:cNvGrpSpPr/>
-        <p:nvPr/>
-      </p:nvGrpSpPr>
-      <p:grpSpPr>
-        <a:xfrm>
-          <a:off x="0" y="0"/>
-          <a:ext cx="0" cy="0"/>
-          <a:chOff x="0" y="0"/>
-          <a:chExt cx="0" cy="0"/>
-        </a:xfrm>
-      </p:grpSpPr>
-      <p:sp>
-        <p:nvSpPr>
-          <p:cNvPr id="2" name="Título 1"/>
-          <p:cNvSpPr>
-            <a:spLocks noGrp="1"/>
-          </p:cNvSpPr>
-          <p:nvPr>
-            <p:ph type="title"/>
-          </p:nvPr>
-        </p:nvSpPr>
-        <p:spPr/>
-        <p:txBody>
-          <a:bodyPr anchor="ctr"/>
-          <a:lstStyle/>
-          <a:p>
-            <a:pPr algn="l"/>
-            <a:r>
-              <a:rPr lang="pt-BR" dirty="0" smtClean="0">
-                <a:solidFill>
-                  <a:schemeClr val="tx1">
-                    <a:lumMod val="50000"/>
-                    <a:lumOff val="50000"/>
-                  </a:schemeClr>
-                </a:solidFill>
-                <a:latin typeface="Bitter" panose="02000000000000000000" pitchFamily="2" charset="0"/>
-              </a:rPr>
-              <a:t>Programação em JAVA</a:t>
-            </a:r>
-            <a:endParaRPr lang="pt-BR" dirty="0">
-              <a:solidFill>
-                <a:schemeClr val="tx1">
-                  <a:lumMod val="50000"/>
-                  <a:lumOff val="50000"/>
-                </a:schemeClr>
-              </a:solidFill>
-              <a:latin typeface="Bitter" panose="02000000000000000000" pitchFamily="2" charset="0"/>
-            </a:endParaRPr>
-          </a:p>
-        </p:txBody>
-      </p:sp>
-      <p:sp>
-        <p:nvSpPr>
-          <p:cNvPr id="3" name="Espaço Reservado para Conteúdo 2"/>
-          <p:cNvSpPr>
-            <a:spLocks noGrp="1"/>
-          </p:cNvSpPr>
-          <p:nvPr>
-            <p:ph idx="1"/>
-          </p:nvPr>
-        </p:nvSpPr>
-        <p:spPr>
-          <a:xfrm>
-            <a:off x="457200" y="1600200"/>
-            <a:ext cx="2622705" cy="4525963"/>
-          </a:xfrm>
-        </p:spPr>
-        <p:txBody>
-          <a:bodyPr>
-            <a:normAutofit fontScale="85000" lnSpcReduction="10000"/>
-          </a:bodyPr>
-          <a:lstStyle/>
-          <a:p>
-            <a:pPr>
-              <a:buClr>
-                <a:schemeClr val="tx1">
-                  <a:lumMod val="50000"/>
-                  <a:lumOff val="50000"/>
-                </a:schemeClr>
-              </a:buClr>
-            </a:pPr>
-            <a:r>
-              <a:rPr lang="pt-BR" sz="2800" dirty="0" smtClean="0">
-                <a:solidFill>
-                  <a:schemeClr val="tx1">
-                    <a:lumMod val="95000"/>
-                    <a:lumOff val="5000"/>
-                  </a:schemeClr>
-                </a:solidFill>
-                <a:latin typeface="Bitter" panose="02000000000000000000" pitchFamily="2" charset="0"/>
-              </a:rPr>
-              <a:t>Estruturas de dados e procedimentos básicos são semelhantes ao C/C++ (em diversos casos o Java possui alguns “</a:t>
-            </a:r>
-            <a:r>
-              <a:rPr lang="pt-BR" sz="2800" dirty="0" err="1" smtClean="0">
-                <a:solidFill>
-                  <a:schemeClr val="tx1">
-                    <a:lumMod val="95000"/>
-                    <a:lumOff val="5000"/>
-                  </a:schemeClr>
-                </a:solidFill>
-                <a:latin typeface="Bitter" panose="02000000000000000000" pitchFamily="2" charset="0"/>
-              </a:rPr>
-              <a:t>plus</a:t>
-            </a:r>
-            <a:r>
-              <a:rPr lang="pt-BR" sz="2800" dirty="0" smtClean="0">
-                <a:solidFill>
-                  <a:schemeClr val="tx1">
-                    <a:lumMod val="95000"/>
-                    <a:lumOff val="5000"/>
-                  </a:schemeClr>
-                </a:solidFill>
-                <a:latin typeface="Bitter" panose="02000000000000000000" pitchFamily="2" charset="0"/>
-              </a:rPr>
-              <a:t>”)</a:t>
-            </a:r>
-            <a:endParaRPr lang="pt-BR" sz="2000" dirty="0" smtClean="0">
-              <a:solidFill>
-                <a:srgbClr val="FF0000"/>
-              </a:solidFill>
-              <a:latin typeface="Bitter" panose="02000000000000000000" pitchFamily="2" charset="0"/>
-            </a:endParaRPr>
-          </a:p>
-        </p:txBody>
-      </p:sp>
-      <p:pic>
-        <p:nvPicPr>
-          <p:cNvPr id="10242" name="Picture 2"/>
-          <p:cNvPicPr>
-            <a:picLocks noChangeAspect="1" noChangeArrowheads="1"/>
-          </p:cNvPicPr>
-          <p:nvPr/>
-        </p:nvPicPr>
-        <p:blipFill>
-          <a:blip r:embed="rId2">
-            <a:extLst>
-              <a:ext uri="{28A0092B-C50C-407E-A947-70E740481C1C}">
-                <a14:useLocalDpi xmlns:a14="http://schemas.microsoft.com/office/drawing/2010/main" val="0"/>
-              </a:ext>
-            </a:extLst>
-          </a:blip>
-          <a:srcRect/>
-          <a:stretch>
-            <a:fillRect/>
-          </a:stretch>
-        </p:blipFill>
-        <p:spPr bwMode="auto">
-          <a:xfrm>
-            <a:off x="3079179" y="2677425"/>
-            <a:ext cx="6029325" cy="2257425"/>
-          </a:xfrm>
-          <a:prstGeom prst="rect">
-            <a:avLst/>
-          </a:prstGeom>
-          <a:noFill/>
-          <a:ln>
-            <a:noFill/>
-          </a:ln>
-          <a:extLst>
-            <a:ext uri="{909E8E84-426E-40DD-AFC4-6F175D3DCCD1}">
-              <a14:hiddenFill xmlns:a14="http://schemas.microsoft.com/office/drawing/2010/main">
-                <a:solidFill>
-                  <a:schemeClr val="accent1"/>
-                </a:solidFill>
-              </a14:hiddenFill>
-            </a:ext>
-            <a:ext uri="{91240B29-F687-4F45-9708-019B960494DF}">
-              <a14:hiddenLine xmlns:a14="http://schemas.microsoft.com/office/drawing/2010/main" w="9525">
-                <a:solidFill>
-                  <a:schemeClr val="tx1"/>
-                </a:solidFill>
-                <a:miter lim="800000"/>
-                <a:headEnd/>
-                <a:tailEnd/>
-              </a14:hiddenLine>
-            </a:ext>
-          </a:extLst>
-        </p:spPr>
-      </p:pic>
-      <p:pic>
-        <p:nvPicPr>
-          <p:cNvPr id="10243" name="Picture 3"/>
-          <p:cNvPicPr>
-            <a:picLocks noChangeAspect="1" noChangeArrowheads="1"/>
-          </p:cNvPicPr>
-          <p:nvPr/>
-        </p:nvPicPr>
-        <p:blipFill>
-          <a:blip r:embed="rId3">
-            <a:extLst>
-              <a:ext uri="{28A0092B-C50C-407E-A947-70E740481C1C}">
-                <a14:useLocalDpi xmlns:a14="http://schemas.microsoft.com/office/drawing/2010/main" val="0"/>
-              </a:ext>
-            </a:extLst>
-          </a:blip>
-          <a:srcRect/>
-          <a:stretch>
-            <a:fillRect/>
-          </a:stretch>
-        </p:blipFill>
-        <p:spPr bwMode="auto">
-          <a:xfrm>
-            <a:off x="3079905" y="4913709"/>
-            <a:ext cx="3371850" cy="1971675"/>
-          </a:xfrm>
-          <a:prstGeom prst="rect">
-            <a:avLst/>
-          </a:prstGeom>
-          <a:noFill/>
-          <a:ln>
-            <a:noFill/>
-          </a:ln>
-          <a:extLst>
-            <a:ext uri="{909E8E84-426E-40DD-AFC4-6F175D3DCCD1}">
-              <a14:hiddenFill xmlns:a14="http://schemas.microsoft.com/office/drawing/2010/main">
-                <a:solidFill>
-                  <a:schemeClr val="accent1"/>
-                </a:solidFill>
-              </a14:hiddenFill>
-            </a:ext>
-            <a:ext uri="{91240B29-F687-4F45-9708-019B960494DF}">
-              <a14:hiddenLine xmlns:a14="http://schemas.microsoft.com/office/drawing/2010/main" w="9525">
-                <a:solidFill>
-                  <a:schemeClr val="tx1"/>
-                </a:solidFill>
-                <a:miter lim="800000"/>
-                <a:headEnd/>
-                <a:tailEnd/>
-              </a14:hiddenLine>
-            </a:ext>
-          </a:extLst>
-        </p:spPr>
-      </p:pic>
-    </p:spTree>
-    <p:extLst>
-      <p:ext uri="{BB962C8B-B14F-4D97-AF65-F5344CB8AC3E}">
-        <p14:creationId xmlns:p14="http://schemas.microsoft.com/office/powerpoint/2010/main" val="179052729"/>
       </p:ext>
     </p:extLst>
   </p:cSld>
@@ -10953,12 +10882,12 @@
         <p:spPr>
           <a:xfrm>
             <a:off x="457200" y="1600200"/>
-            <a:ext cx="4042792" cy="4525963"/>
+            <a:ext cx="2622705" cy="4525963"/>
           </a:xfrm>
         </p:spPr>
         <p:txBody>
           <a:bodyPr>
-            <a:normAutofit lnSpcReduction="10000"/>
+            <a:normAutofit fontScale="85000" lnSpcReduction="10000"/>
           </a:bodyPr>
           <a:lstStyle/>
           <a:p>
@@ -10980,7 +10909,31 @@
                 </a:solidFill>
                 <a:latin typeface="Bitter" panose="02000000000000000000" pitchFamily="2" charset="0"/>
               </a:rPr>
-              <a:t>Exemplo: faça uma classe para representar o tipo Ponto e tipo Quadrado e crie um método que gere um novo quadrado a partir da interseção de 2 quadrados</a:t>
+              <a:t>Estruturas de dados e procedimentos básicos são semelhantes ao C/C++ (em diversos casos o Java possui alguns “</a:t>
+            </a:r>
+            <a:r>
+              <a:rPr lang="pt-BR" sz="2800" dirty="0" err="1" smtClean="0">
+                <a:solidFill>
+                  <a:schemeClr val="tx1">
+                    <a:lumMod val="95000"/>
+                    <a:lumOff val="5000"/>
+                  </a:schemeClr>
+                </a:solidFill>
+                <a:latin typeface="Bitter" panose="02000000000000000000" pitchFamily="2" charset="0"/>
+              </a:rPr>
+              <a:t>plus</a:t>
+            </a:r>
+            <a:r>
+              <a:rPr lang="pt-BR" sz="2800" dirty="0" smtClean="0">
+                <a:solidFill>
+                  <a:schemeClr val="tx1">
+                    <a:lumMod val="95000"/>
+                    <a:lumOff val="5000"/>
+                  </a:schemeClr>
+                </a:solidFill>
+                <a:latin typeface="Bitter" panose="02000000000000000000" pitchFamily="2" charset="0"/>
+              </a:rPr>
+              <a:t>”)</a:t>
             </a:r>
             <a:endParaRPr lang="pt-BR" sz="2000" dirty="0" smtClean="0">
               <a:solidFill>
@@ -10993,7 +10946,7 @@
       </p:sp>
       <p:pic>
         <p:nvPicPr>
-          <p:cNvPr id="5123" name="Picture 3"/>
+          <p:cNvPr id="10242" name="Picture 2"/>
           <p:cNvPicPr>
             <a:picLocks noChangeAspect="1" noChangeArrowheads="1"/>
           </p:cNvPicPr>
@@ -11014,8 +10967,8 @@
         </p:blipFill>
         <p:spPr bwMode="auto">
           <a:xfrm>
-            <a:off x="4644008" y="3093875"/>
-            <a:ext cx="5400600" cy="3798224"/>
+            <a:off x="3079179" y="2677425"/>
+            <a:ext cx="6029325" cy="2257425"/>
           </a:xfrm>
           <a:prstGeom prst="rect">
             <a:avLst/>
@@ -11045,10 +10998,64 @@
           </a:extLst>
         </p:spPr>
       </p:pic>
+      <p:pic>
+        <p:nvPicPr>
+          <p:cNvPr id="10243" name="Picture 3"/>
+          <p:cNvPicPr>
+            <a:picLocks noChangeAspect="1" noChangeArrowheads="1"/>
+          </p:cNvPicPr>
+          <p:nvPr/>
+        </p:nvPicPr>
+        <p:blipFill>
+          <a:blip r:embed="rId3">
+            <a:extLst>
+              <a:ext uri="{28A0092B-C50C-407E-A947-70E740481C1C}">
+                <a14:useLocalDpi xmlns:a14="http://schemas.microsoft.com/office/drawing/2010/main" val="0"/>
+              </a:ext>
+            </a:extLst>
+          </a:blip>
+          <a:srcRect/>
+          <a:stretch>
+            <a:fillRect/>
+          </a:stretch>
+        </p:blipFill>
+        <p:spPr bwMode="auto">
+          <a:xfrm>
+            <a:off x="3079905" y="4913709"/>
+            <a:ext cx="3371850" cy="1971675"/>
+          </a:xfrm>
+          <a:prstGeom prst="rect">
+            <a:avLst/>
+          </a:prstGeom>
+          <a:noFill/>
+          <a:ln>
+            <a:noFill/>
+          </a:ln>
+          <a:extLst>
+            <a:ext uri="{909E8E84-426E-40DD-AFC4-6F175D3DCCD1}">
+              <a14:hiddenFill xmlns:a14="http://schemas.microsoft.com/office/drawing/2010/main">
+                <a:solidFill>
+                  <a:schemeClr val="accent1"/>
+                </a:solidFill>
+              </a14:hiddenFill>
+            </a:ext>
+            <a:ext uri="{91240B29-F687-4F45-9708-019B960494DF}">
+              <a14:hiddenLine xmlns:a14="http://schemas.microsoft.com/office/drawing/2010/main" w="9525">
+                <a:solidFill>
+                  <a:schemeClr val="tx1"/>
+                </a:solidFill>
+                <a:miter lim="800000"/>
+                <a:headEnd/>
+                <a:tailEnd/>
+              </a14:hiddenLine>
+            </a:ext>
+          </a:extLst>
+        </p:spPr>
+      </p:pic>
     </p:spTree>
     <p:extLst>
       <p:ext uri="{BB962C8B-B14F-4D97-AF65-F5344CB8AC3E}">
-        <p14:creationId xmlns:p14="http://schemas.microsoft.com/office/powerpoint/2010/main" val="3558929054"/>
+        <p14:creationId xmlns:p14="http://schemas.microsoft.com/office/powerpoint/2010/main" val="179052729"/>
       </p:ext>
     </p:extLst>
   </p:cSld>
@@ -11140,10 +11147,15 @@
             <p:ph idx="1"/>
           </p:nvPr>
         </p:nvSpPr>
-        <p:spPr/>
+        <p:spPr>
+          <a:xfrm>
+            <a:off x="457200" y="1600200"/>
+            <a:ext cx="4042792" cy="4525963"/>
+          </a:xfrm>
+        </p:spPr>
         <p:txBody>
           <a:bodyPr>
-            <a:normAutofit/>
+            <a:normAutofit lnSpcReduction="10000"/>
           </a:bodyPr>
           <a:lstStyle/>
           <a:p>
@@ -11165,7 +11177,7 @@
                 </a:solidFill>
                 <a:latin typeface="Bitter" panose="02000000000000000000" pitchFamily="2" charset="0"/>
               </a:rPr>
-              <a:t>Exemplo: Ponto.java</a:t>
+              <a:t>Exemplo: faça uma classe para representar o tipo Ponto e tipo Quadrado e crie um método que gere um novo quadrado a partir da interseção de 2 quadrados</a:t>
             </a:r>
             <a:endParaRPr lang="pt-BR" sz="2000" dirty="0" smtClean="0">
               <a:solidFill>
@@ -11178,7 +11190,7 @@
       </p:sp>
       <p:pic>
         <p:nvPicPr>
-          <p:cNvPr id="6146" name="Picture 2"/>
+          <p:cNvPr id="5123" name="Picture 3"/>
           <p:cNvPicPr>
             <a:picLocks noChangeAspect="1" noChangeArrowheads="1"/>
           </p:cNvPicPr>
@@ -11199,8 +11211,8 @@
         </p:blipFill>
         <p:spPr bwMode="auto">
           <a:xfrm>
-            <a:off x="2267744" y="2719958"/>
-            <a:ext cx="4895230" cy="2797274"/>
+            <a:off x="4644008" y="3093875"/>
+            <a:ext cx="5400600" cy="3798224"/>
           </a:xfrm>
           <a:prstGeom prst="rect">
             <a:avLst/>
@@ -11233,7 +11245,7 @@
     </p:spTree>
     <p:extLst>
       <p:ext uri="{BB962C8B-B14F-4D97-AF65-F5344CB8AC3E}">
-        <p14:creationId xmlns:p14="http://schemas.microsoft.com/office/powerpoint/2010/main" val="3948144048"/>
+        <p14:creationId xmlns:p14="http://schemas.microsoft.com/office/powerpoint/2010/main" val="3558929054"/>
       </p:ext>
     </p:extLst>
   </p:cSld>
@@ -11325,12 +11337,7 @@
             <p:ph idx="1"/>
           </p:nvPr>
         </p:nvSpPr>
-        <p:spPr>
-          <a:xfrm>
-            <a:off x="457200" y="1600200"/>
-            <a:ext cx="4042792" cy="4525963"/>
-          </a:xfrm>
-        </p:spPr>
+        <p:spPr/>
         <p:txBody>
           <a:bodyPr>
             <a:normAutofit/>
@@ -11355,7 +11362,7 @@
                 </a:solidFill>
                 <a:latin typeface="Bitter" panose="02000000000000000000" pitchFamily="2" charset="0"/>
               </a:rPr>
-              <a:t>Exemplo: Quadrado.java</a:t>
+              <a:t>Exemplo: Ponto.java</a:t>
             </a:r>
             <a:endParaRPr lang="pt-BR" sz="2000" dirty="0" smtClean="0">
               <a:solidFill>
@@ -11368,7 +11375,7 @@
       </p:sp>
       <p:pic>
         <p:nvPicPr>
-          <p:cNvPr id="7170" name="Picture 2"/>
+          <p:cNvPr id="6146" name="Picture 2"/>
           <p:cNvPicPr>
             <a:picLocks noChangeAspect="1" noChangeArrowheads="1"/>
           </p:cNvPicPr>
@@ -11389,8 +11396,8 @@
         </p:blipFill>
         <p:spPr bwMode="auto">
           <a:xfrm>
-            <a:off x="4283968" y="1268760"/>
-            <a:ext cx="4829436" cy="5589240"/>
+            <a:off x="2267744" y="2719958"/>
+            <a:ext cx="4895230" cy="2797274"/>
           </a:xfrm>
           <a:prstGeom prst="rect">
             <a:avLst/>
@@ -11423,7 +11430,7 @@
     </p:spTree>
     <p:extLst>
       <p:ext uri="{BB962C8B-B14F-4D97-AF65-F5344CB8AC3E}">
-        <p14:creationId xmlns:p14="http://schemas.microsoft.com/office/powerpoint/2010/main" val="3206441195"/>
+        <p14:creationId xmlns:p14="http://schemas.microsoft.com/office/powerpoint/2010/main" val="3948144048"/>
       </p:ext>
     </p:extLst>
   </p:cSld>
@@ -11515,7 +11522,12 @@
             <p:ph idx="1"/>
           </p:nvPr>
         </p:nvSpPr>
-        <p:spPr/>
+        <p:spPr>
+          <a:xfrm>
+            <a:off x="457200" y="1600200"/>
+            <a:ext cx="4042792" cy="4525963"/>
+          </a:xfrm>
+        </p:spPr>
         <p:txBody>
           <a:bodyPr>
             <a:normAutofit/>
@@ -11540,7 +11552,7 @@
                 </a:solidFill>
                 <a:latin typeface="Bitter" panose="02000000000000000000" pitchFamily="2" charset="0"/>
               </a:rPr>
-              <a:t>Exemplo: Main.java</a:t>
+              <a:t>Exemplo: Quadrado.java</a:t>
             </a:r>
             <a:endParaRPr lang="pt-BR" sz="2000" dirty="0" smtClean="0">
               <a:solidFill>
@@ -11553,7 +11565,7 @@
       </p:sp>
       <p:pic>
         <p:nvPicPr>
-          <p:cNvPr id="8194" name="Picture 2"/>
+          <p:cNvPr id="7170" name="Picture 2"/>
           <p:cNvPicPr>
             <a:picLocks noChangeAspect="1" noChangeArrowheads="1"/>
           </p:cNvPicPr>
@@ -11574,8 +11586,8 @@
         </p:blipFill>
         <p:spPr bwMode="auto">
           <a:xfrm>
-            <a:off x="3347864" y="2204864"/>
-            <a:ext cx="5657850" cy="4505325"/>
+            <a:off x="4283968" y="1268760"/>
+            <a:ext cx="4829436" cy="5589240"/>
           </a:xfrm>
           <a:prstGeom prst="rect">
             <a:avLst/>
@@ -11608,7 +11620,7 @@
     </p:spTree>
     <p:extLst>
       <p:ext uri="{BB962C8B-B14F-4D97-AF65-F5344CB8AC3E}">
-        <p14:creationId xmlns:p14="http://schemas.microsoft.com/office/powerpoint/2010/main" val="2921536197"/>
+        <p14:creationId xmlns:p14="http://schemas.microsoft.com/office/powerpoint/2010/main" val="3206441195"/>
       </p:ext>
     </p:extLst>
   </p:cSld>
@@ -11738,7 +11750,7 @@
       </p:sp>
       <p:pic>
         <p:nvPicPr>
-          <p:cNvPr id="9218" name="Picture 2"/>
+          <p:cNvPr id="8194" name="Picture 2"/>
           <p:cNvPicPr>
             <a:picLocks noChangeAspect="1" noChangeArrowheads="1"/>
           </p:cNvPicPr>
@@ -11759,8 +11771,8 @@
         </p:blipFill>
         <p:spPr bwMode="auto">
           <a:xfrm>
-            <a:off x="827584" y="2554455"/>
-            <a:ext cx="7449213" cy="2602737"/>
+            <a:off x="3347864" y="2204864"/>
+            <a:ext cx="5657850" cy="4505325"/>
           </a:xfrm>
           <a:prstGeom prst="rect">
             <a:avLst/>
@@ -11793,7 +11805,7 @@
     </p:spTree>
     <p:extLst>
       <p:ext uri="{BB962C8B-B14F-4D97-AF65-F5344CB8AC3E}">
-        <p14:creationId xmlns:p14="http://schemas.microsoft.com/office/powerpoint/2010/main" val="2122042097"/>
+        <p14:creationId xmlns:p14="http://schemas.microsoft.com/office/powerpoint/2010/main" val="2921536197"/>
       </p:ext>
     </p:extLst>
   </p:cSld>
@@ -11910,7 +11922,7 @@
                 </a:solidFill>
                 <a:latin typeface="Bitter" panose="02000000000000000000" pitchFamily="2" charset="0"/>
               </a:rPr>
-              <a:t>+Leitura de dados</a:t>
+              <a:t>Exemplo: Main.java</a:t>
             </a:r>
             <a:endParaRPr lang="pt-BR" sz="2000" dirty="0" smtClean="0">
               <a:solidFill>
@@ -11923,7 +11935,7 @@
       </p:sp>
       <p:pic>
         <p:nvPicPr>
-          <p:cNvPr id="11266" name="Picture 2"/>
+          <p:cNvPr id="9218" name="Picture 2"/>
           <p:cNvPicPr>
             <a:picLocks noChangeAspect="1" noChangeArrowheads="1"/>
           </p:cNvPicPr>
@@ -11944,8 +11956,8 @@
         </p:blipFill>
         <p:spPr bwMode="auto">
           <a:xfrm>
-            <a:off x="987384" y="2276872"/>
-            <a:ext cx="7392064" cy="3816424"/>
+            <a:off x="827584" y="2554455"/>
+            <a:ext cx="7449213" cy="2602737"/>
           </a:xfrm>
           <a:prstGeom prst="rect">
             <a:avLst/>
@@ -11978,7 +11990,7 @@
     </p:spTree>
     <p:extLst>
       <p:ext uri="{BB962C8B-B14F-4D97-AF65-F5344CB8AC3E}">
-        <p14:creationId xmlns:p14="http://schemas.microsoft.com/office/powerpoint/2010/main" val="1511242040"/>
+        <p14:creationId xmlns:p14="http://schemas.microsoft.com/office/powerpoint/2010/main" val="2122042097"/>
       </p:ext>
     </p:extLst>
   </p:cSld>
@@ -12108,7 +12120,7 @@
       </p:sp>
       <p:pic>
         <p:nvPicPr>
-          <p:cNvPr id="13314" name="Picture 2"/>
+          <p:cNvPr id="11266" name="Picture 2"/>
           <p:cNvPicPr>
             <a:picLocks noChangeAspect="1" noChangeArrowheads="1"/>
           </p:cNvPicPr>
@@ -12129,8 +12141,8 @@
         </p:blipFill>
         <p:spPr bwMode="auto">
           <a:xfrm>
-            <a:off x="755576" y="2659322"/>
-            <a:ext cx="7579001" cy="2706786"/>
+            <a:off x="987384" y="2276872"/>
+            <a:ext cx="7392064" cy="3816424"/>
           </a:xfrm>
           <a:prstGeom prst="rect">
             <a:avLst/>
@@ -12163,7 +12175,7 @@
     </p:spTree>
     <p:extLst>
       <p:ext uri="{BB962C8B-B14F-4D97-AF65-F5344CB8AC3E}">
-        <p14:creationId xmlns:p14="http://schemas.microsoft.com/office/powerpoint/2010/main" val="2721116530"/>
+        <p14:creationId xmlns:p14="http://schemas.microsoft.com/office/powerpoint/2010/main" val="1511242040"/>
       </p:ext>
     </p:extLst>
   </p:cSld>
@@ -12293,6 +12305,191 @@
       </p:sp>
       <p:pic>
         <p:nvPicPr>
+          <p:cNvPr id="13314" name="Picture 2"/>
+          <p:cNvPicPr>
+            <a:picLocks noChangeAspect="1" noChangeArrowheads="1"/>
+          </p:cNvPicPr>
+          <p:nvPr/>
+        </p:nvPicPr>
+        <p:blipFill>
+          <a:blip r:embed="rId2">
+            <a:extLst>
+              <a:ext uri="{28A0092B-C50C-407E-A947-70E740481C1C}">
+                <a14:useLocalDpi xmlns:a14="http://schemas.microsoft.com/office/drawing/2010/main" val="0"/>
+              </a:ext>
+            </a:extLst>
+          </a:blip>
+          <a:srcRect/>
+          <a:stretch>
+            <a:fillRect/>
+          </a:stretch>
+        </p:blipFill>
+        <p:spPr bwMode="auto">
+          <a:xfrm>
+            <a:off x="755576" y="2659322"/>
+            <a:ext cx="7579001" cy="2706786"/>
+          </a:xfrm>
+          <a:prstGeom prst="rect">
+            <a:avLst/>
+          </a:prstGeom>
+          <a:noFill/>
+          <a:ln>
+            <a:noFill/>
+          </a:ln>
+          <a:extLst>
+            <a:ext uri="{909E8E84-426E-40DD-AFC4-6F175D3DCCD1}">
+              <a14:hiddenFill xmlns:a14="http://schemas.microsoft.com/office/drawing/2010/main">
+                <a:solidFill>
+                  <a:schemeClr val="accent1"/>
+                </a:solidFill>
+              </a14:hiddenFill>
+            </a:ext>
+            <a:ext uri="{91240B29-F687-4F45-9708-019B960494DF}">
+              <a14:hiddenLine xmlns:a14="http://schemas.microsoft.com/office/drawing/2010/main" w="9525">
+                <a:solidFill>
+                  <a:schemeClr val="tx1"/>
+                </a:solidFill>
+                <a:miter lim="800000"/>
+                <a:headEnd/>
+                <a:tailEnd/>
+              </a14:hiddenLine>
+            </a:ext>
+          </a:extLst>
+        </p:spPr>
+      </p:pic>
+    </p:spTree>
+    <p:extLst>
+      <p:ext uri="{BB962C8B-B14F-4D97-AF65-F5344CB8AC3E}">
+        <p14:creationId xmlns:p14="http://schemas.microsoft.com/office/powerpoint/2010/main" val="2721116530"/>
+      </p:ext>
+    </p:extLst>
+  </p:cSld>
+  <p:clrMapOvr>
+    <a:masterClrMapping/>
+  </p:clrMapOvr>
+  <mc:AlternateContent xmlns:mc="http://schemas.openxmlformats.org/markup-compatibility/2006" xmlns:p14="http://schemas.microsoft.com/office/powerpoint/2010/main">
+    <mc:Choice Requires="p14">
+      <p:transition p14:dur="0"/>
+    </mc:Choice>
+    <mc:Fallback xmlns="">
+      <p:transition/>
+    </mc:Fallback>
+  </mc:AlternateContent>
+  <p:timing>
+    <p:tnLst>
+      <p:par>
+        <p:cTn id="1" dur="indefinite" restart="never" nodeType="tmRoot"/>
+      </p:par>
+    </p:tnLst>
+  </p:timing>
+</p:sld>
+</file>
+
+<file path=ppt/slides/slide38.xml><?xml version="1.0" encoding="utf-8"?>
+<p:sld xmlns:a="http://schemas.openxmlformats.org/drawingml/2006/main" xmlns:r="http://schemas.openxmlformats.org/officeDocument/2006/relationships" xmlns:p="http://schemas.openxmlformats.org/presentationml/2006/main">
+  <p:cSld>
+    <p:spTree>
+      <p:nvGrpSpPr>
+        <p:cNvPr id="1" name=""/>
+        <p:cNvGrpSpPr/>
+        <p:nvPr/>
+      </p:nvGrpSpPr>
+      <p:grpSpPr>
+        <a:xfrm>
+          <a:off x="0" y="0"/>
+          <a:ext cx="0" cy="0"/>
+          <a:chOff x="0" y="0"/>
+          <a:chExt cx="0" cy="0"/>
+        </a:xfrm>
+      </p:grpSpPr>
+      <p:sp>
+        <p:nvSpPr>
+          <p:cNvPr id="2" name="Título 1"/>
+          <p:cNvSpPr>
+            <a:spLocks noGrp="1"/>
+          </p:cNvSpPr>
+          <p:nvPr>
+            <p:ph type="title"/>
+          </p:nvPr>
+        </p:nvSpPr>
+        <p:spPr/>
+        <p:txBody>
+          <a:bodyPr anchor="ctr"/>
+          <a:lstStyle/>
+          <a:p>
+            <a:pPr algn="l"/>
+            <a:r>
+              <a:rPr lang="pt-BR" dirty="0" smtClean="0">
+                <a:solidFill>
+                  <a:schemeClr val="tx1">
+                    <a:lumMod val="50000"/>
+                    <a:lumOff val="50000"/>
+                  </a:schemeClr>
+                </a:solidFill>
+                <a:latin typeface="Bitter" panose="02000000000000000000" pitchFamily="2" charset="0"/>
+              </a:rPr>
+              <a:t>Programação em JAVA</a:t>
+            </a:r>
+            <a:endParaRPr lang="pt-BR" dirty="0">
+              <a:solidFill>
+                <a:schemeClr val="tx1">
+                  <a:lumMod val="50000"/>
+                  <a:lumOff val="50000"/>
+                </a:schemeClr>
+              </a:solidFill>
+              <a:latin typeface="Bitter" panose="02000000000000000000" pitchFamily="2" charset="0"/>
+            </a:endParaRPr>
+          </a:p>
+        </p:txBody>
+      </p:sp>
+      <p:sp>
+        <p:nvSpPr>
+          <p:cNvPr id="3" name="Espaço Reservado para Conteúdo 2"/>
+          <p:cNvSpPr>
+            <a:spLocks noGrp="1"/>
+          </p:cNvSpPr>
+          <p:nvPr>
+            <p:ph idx="1"/>
+          </p:nvPr>
+        </p:nvSpPr>
+        <p:spPr/>
+        <p:txBody>
+          <a:bodyPr>
+            <a:normAutofit/>
+          </a:bodyPr>
+          <a:lstStyle/>
+          <a:p>
+            <a:pPr>
+              <a:buClr>
+                <a:schemeClr val="tx1">
+                  <a:lumMod val="50000"/>
+                  <a:lumOff val="50000"/>
+                </a:schemeClr>
+              </a:buClr>
+            </a:pPr>
+            <a:r>
+              <a:rPr lang="pt-BR" sz="2800" dirty="0" smtClean="0">
+                <a:solidFill>
+                  <a:schemeClr val="tx1">
+                    <a:lumMod val="95000"/>
+                    <a:lumOff val="5000"/>
+                  </a:schemeClr>
+                </a:solidFill>
+                <a:latin typeface="Bitter" panose="02000000000000000000" pitchFamily="2" charset="0"/>
+              </a:rPr>
+              <a:t>+Leitura de dados</a:t>
+            </a:r>
+            <a:endParaRPr lang="pt-BR" sz="2000" dirty="0" smtClean="0">
+              <a:solidFill>
+                <a:srgbClr val="FF0000"/>
+              </a:solidFill>
+              <a:latin typeface="Bitter" panose="02000000000000000000" pitchFamily="2" charset="0"/>
+            </a:endParaRPr>
+          </a:p>
+        </p:txBody>
+      </p:sp>
+      <p:pic>
+        <p:nvPicPr>
           <p:cNvPr id="12290" name="Picture 2"/>
           <p:cNvPicPr>
             <a:picLocks noChangeAspect="1" noChangeArrowheads="1"/>
@@ -12371,7 +12568,7 @@
 </p:sld>
 </file>
 
-<file path=ppt/slides/slide38.xml><?xml version="1.0" encoding="utf-8"?>
+<file path=ppt/slides/slide39.xml><?xml version="1.0" encoding="utf-8"?>
 <p:sld xmlns:a="http://schemas.openxmlformats.org/drawingml/2006/main" xmlns:r="http://schemas.openxmlformats.org/officeDocument/2006/relationships" xmlns:p="http://schemas.openxmlformats.org/presentationml/2006/main">
   <p:cSld>
     <p:spTree>
@@ -13828,19 +14025,7 @@
                 </a:solidFill>
                 <a:latin typeface="Bitter" panose="02000000000000000000" pitchFamily="2" charset="0"/>
               </a:rPr>
-              <a:t>Contém </a:t>
-            </a:r>
-            <a:r>
-              <a:rPr lang="pt-BR" sz="2800" dirty="0" smtClean="0">
-                <a:solidFill>
-                  <a:schemeClr val="tx1">
-                    <a:lumMod val="95000"/>
-                    <a:lumOff val="5000"/>
-                  </a:schemeClr>
-                </a:solidFill>
-                <a:latin typeface="Bitter" panose="02000000000000000000" pitchFamily="2" charset="0"/>
-              </a:rPr>
-              <a:t>instruções, uma tabela de símbolos e outras informações</a:t>
+              <a:t>Contém instruções, uma tabela de símbolos e outras informações</a:t>
             </a:r>
           </a:p>
           <a:p>

</xml_diff>